<commit_message>
v1: update class diagram, usecase diagram, and PPT after changing recovery term to recover
</commit_message>
<xml_diff>
--- a/docs/PPT/PPT.pptx
+++ b/docs/PPT/PPT.pptx
@@ -8597,7 +8597,7 @@
     <a:masterClrMapping/>
   </p:clrMapOvr>
   <mc:AlternateContent xmlns:mc="http://schemas.openxmlformats.org/markup-compatibility/2006">
-    <mc:Choice xmlns="" xmlns:p14="http://schemas.microsoft.com/office/powerpoint/2010/main" xmlns:p15="http://schemas.microsoft.com/office/powerpoint/2012/main" Requires="p14">
+    <mc:Choice xmlns:p15="http://schemas.microsoft.com/office/powerpoint/2012/main" xmlns:p14="http://schemas.microsoft.com/office/powerpoint/2010/main" xmlns="" Requires="p14">
       <p:transition spd="slow" p14:dur="2000"/>
     </mc:Choice>
     <mc:Fallback>
@@ -8899,7 +8899,7 @@
     <a:masterClrMapping/>
   </p:clrMapOvr>
   <mc:AlternateContent xmlns:mc="http://schemas.openxmlformats.org/markup-compatibility/2006">
-    <mc:Choice xmlns="" xmlns:p14="http://schemas.microsoft.com/office/powerpoint/2010/main" xmlns:p15="http://schemas.microsoft.com/office/powerpoint/2012/main" Requires="p14">
+    <mc:Choice xmlns:p15="http://schemas.microsoft.com/office/powerpoint/2012/main" xmlns:p14="http://schemas.microsoft.com/office/powerpoint/2010/main" xmlns="" Requires="p14">
       <p:transition spd="slow" p14:dur="2000"/>
     </mc:Choice>
     <mc:Fallback>
@@ -9201,7 +9201,7 @@
     <a:masterClrMapping/>
   </p:clrMapOvr>
   <mc:AlternateContent xmlns:mc="http://schemas.openxmlformats.org/markup-compatibility/2006">
-    <mc:Choice xmlns="" xmlns:p14="http://schemas.microsoft.com/office/powerpoint/2010/main" xmlns:p15="http://schemas.microsoft.com/office/powerpoint/2012/main" Requires="p14">
+    <mc:Choice xmlns:p15="http://schemas.microsoft.com/office/powerpoint/2012/main" xmlns:p14="http://schemas.microsoft.com/office/powerpoint/2010/main" xmlns="" Requires="p14">
       <p:transition spd="slow" p14:dur="2000"/>
     </mc:Choice>
     <mc:Fallback>
@@ -9678,7 +9678,7 @@
     <a:masterClrMapping/>
   </p:clrMapOvr>
   <mc:AlternateContent xmlns:mc="http://schemas.openxmlformats.org/markup-compatibility/2006">
-    <mc:Choice xmlns="" xmlns:p14="http://schemas.microsoft.com/office/powerpoint/2010/main" xmlns:p15="http://schemas.microsoft.com/office/powerpoint/2012/main" Requires="p14">
+    <mc:Choice xmlns:p15="http://schemas.microsoft.com/office/powerpoint/2012/main" xmlns:p14="http://schemas.microsoft.com/office/powerpoint/2010/main" xmlns="" Requires="p14">
       <p:transition spd="slow" p14:dur="2000"/>
     </mc:Choice>
     <mc:Fallback>
@@ -10205,7 +10205,7 @@
     <a:masterClrMapping/>
   </p:clrMapOvr>
   <mc:AlternateContent xmlns:mc="http://schemas.openxmlformats.org/markup-compatibility/2006">
-    <mc:Choice xmlns="" xmlns:p14="http://schemas.microsoft.com/office/powerpoint/2010/main" xmlns:p15="http://schemas.microsoft.com/office/powerpoint/2012/main" Requires="p14">
+    <mc:Choice xmlns:p15="http://schemas.microsoft.com/office/powerpoint/2012/main" xmlns:p14="http://schemas.microsoft.com/office/powerpoint/2010/main" xmlns="" Requires="p14">
       <p:transition spd="slow" p14:dur="2000"/>
     </mc:Choice>
     <mc:Fallback>
@@ -10399,7 +10399,7 @@
     <a:masterClrMapping/>
   </p:clrMapOvr>
   <mc:AlternateContent xmlns:mc="http://schemas.openxmlformats.org/markup-compatibility/2006">
-    <mc:Choice xmlns="" xmlns:p14="http://schemas.microsoft.com/office/powerpoint/2010/main" xmlns:p15="http://schemas.microsoft.com/office/powerpoint/2012/main" Requires="p14">
+    <mc:Choice xmlns:p15="http://schemas.microsoft.com/office/powerpoint/2012/main" xmlns:p14="http://schemas.microsoft.com/office/powerpoint/2010/main" xmlns="" Requires="p14">
       <p:transition spd="slow" p14:dur="2000"/>
     </mc:Choice>
     <mc:Fallback>
@@ -11675,7 +11675,7 @@
     <a:masterClrMapping/>
   </p:clrMapOvr>
   <mc:AlternateContent xmlns:mc="http://schemas.openxmlformats.org/markup-compatibility/2006">
-    <mc:Choice xmlns="" xmlns:p14="http://schemas.microsoft.com/office/powerpoint/2010/main" xmlns:p15="http://schemas.microsoft.com/office/powerpoint/2012/main" Requires="p14">
+    <mc:Choice xmlns:p15="http://schemas.microsoft.com/office/powerpoint/2012/main" xmlns:p14="http://schemas.microsoft.com/office/powerpoint/2010/main" xmlns="" Requires="p14">
       <p:transition spd="slow" p14:dur="2000"/>
     </mc:Choice>
     <mc:Fallback>
@@ -11869,7 +11869,7 @@
     <a:masterClrMapping/>
   </p:clrMapOvr>
   <mc:AlternateContent xmlns:mc="http://schemas.openxmlformats.org/markup-compatibility/2006">
-    <mc:Choice xmlns="" xmlns:p14="http://schemas.microsoft.com/office/powerpoint/2010/main" xmlns:p15="http://schemas.microsoft.com/office/powerpoint/2012/main" Requires="p14">
+    <mc:Choice xmlns:p15="http://schemas.microsoft.com/office/powerpoint/2012/main" xmlns:p14="http://schemas.microsoft.com/office/powerpoint/2010/main" xmlns="" Requires="p14">
       <p:transition spd="slow" p14:dur="2000"/>
     </mc:Choice>
     <mc:Fallback>
@@ -12073,25 +12073,28 @@
       </p:sp>
       <p:pic>
         <p:nvPicPr>
-          <p:cNvPr id="281" name="Picture 280"/>
-          <p:cNvPicPr/>
+          <p:cNvPr id="12" name="Picture 3" descr="Z:\media\ghiffaryr\Storage1\AIO\Kuliah\G2Academy\WMD\Project\AIQuantAssistant\docs\Usecase_Diagram\Usecase.jpg"/>
+          <p:cNvPicPr>
+            <a:picLocks noChangeAspect="1" noChangeArrowheads="1"/>
+          </p:cNvPicPr>
           <p:nvPr/>
         </p:nvPicPr>
         <p:blipFill>
           <a:blip r:embed="rId2" cstate="print"/>
-          <a:stretch/>
+          <a:srcRect/>
+          <a:stretch>
+            <a:fillRect/>
+          </a:stretch>
         </p:blipFill>
-        <p:spPr>
-          <a:xfrm>
-            <a:off x="2971800" y="196920"/>
-            <a:ext cx="5619960" cy="4832280"/>
-          </a:xfrm>
-          <a:prstGeom prst="rect">
-            <a:avLst/>
-          </a:prstGeom>
-          <a:ln w="0">
-            <a:noFill/>
-          </a:ln>
+        <p:spPr bwMode="auto">
+          <a:xfrm>
+            <a:off x="3071802" y="214296"/>
+            <a:ext cx="5483547" cy="4714908"/>
+          </a:xfrm>
+          <a:prstGeom prst="rect">
+            <a:avLst/>
+          </a:prstGeom>
+          <a:noFill/>
         </p:spPr>
       </p:pic>
     </p:spTree>
@@ -12100,7 +12103,7 @@
     <a:masterClrMapping/>
   </p:clrMapOvr>
   <mc:AlternateContent xmlns:mc="http://schemas.openxmlformats.org/markup-compatibility/2006">
-    <mc:Choice xmlns="" xmlns:p14="http://schemas.microsoft.com/office/powerpoint/2010/main" xmlns:p15="http://schemas.microsoft.com/office/powerpoint/2012/main" Requires="p14">
+    <mc:Choice xmlns:p15="http://schemas.microsoft.com/office/powerpoint/2012/main" xmlns:p14="http://schemas.microsoft.com/office/powerpoint/2010/main" xmlns="" Requires="p14">
       <p:transition spd="slow" p14:dur="2000"/>
     </mc:Choice>
     <mc:Fallback>
@@ -12294,7 +12297,7 @@
     <a:masterClrMapping/>
   </p:clrMapOvr>
   <mc:AlternateContent xmlns:mc="http://schemas.openxmlformats.org/markup-compatibility/2006">
-    <mc:Choice xmlns="" xmlns:p14="http://schemas.microsoft.com/office/powerpoint/2010/main" xmlns:p15="http://schemas.microsoft.com/office/powerpoint/2012/main" Requires="p14">
+    <mc:Choice xmlns:p15="http://schemas.microsoft.com/office/powerpoint/2012/main" xmlns:p14="http://schemas.microsoft.com/office/powerpoint/2010/main" xmlns="" Requires="p14">
       <p:transition spd="slow" p14:dur="2000"/>
     </mc:Choice>
     <mc:Fallback>
@@ -12525,7 +12528,7 @@
     <a:masterClrMapping/>
   </p:clrMapOvr>
   <mc:AlternateContent xmlns:mc="http://schemas.openxmlformats.org/markup-compatibility/2006">
-    <mc:Choice xmlns="" xmlns:p14="http://schemas.microsoft.com/office/powerpoint/2010/main" xmlns:p15="http://schemas.microsoft.com/office/powerpoint/2012/main" Requires="p14">
+    <mc:Choice xmlns:p15="http://schemas.microsoft.com/office/powerpoint/2012/main" xmlns:p14="http://schemas.microsoft.com/office/powerpoint/2010/main" xmlns="" Requires="p14">
       <p:transition spd="slow" p14:dur="2000"/>
     </mc:Choice>
     <mc:Fallback>
@@ -13673,7 +13676,7 @@
     <a:masterClrMapping/>
   </p:clrMapOvr>
   <mc:AlternateContent xmlns:mc="http://schemas.openxmlformats.org/markup-compatibility/2006">
-    <mc:Choice xmlns="" xmlns:p14="http://schemas.microsoft.com/office/powerpoint/2010/main" xmlns:p15="http://schemas.microsoft.com/office/powerpoint/2012/main" Requires="p14">
+    <mc:Choice xmlns:p15="http://schemas.microsoft.com/office/powerpoint/2012/main" xmlns:p14="http://schemas.microsoft.com/office/powerpoint/2010/main" xmlns="" Requires="p14">
       <p:transition spd="slow" p14:dur="2000"/>
     </mc:Choice>
     <mc:Fallback>
@@ -13867,7 +13870,7 @@
     <a:masterClrMapping/>
   </p:clrMapOvr>
   <mc:AlternateContent xmlns:mc="http://schemas.openxmlformats.org/markup-compatibility/2006">
-    <mc:Choice xmlns="" xmlns:p14="http://schemas.microsoft.com/office/powerpoint/2010/main" xmlns:p15="http://schemas.microsoft.com/office/powerpoint/2012/main" Requires="p14">
+    <mc:Choice xmlns:p15="http://schemas.microsoft.com/office/powerpoint/2012/main" xmlns:p14="http://schemas.microsoft.com/office/powerpoint/2010/main" xmlns="" Requires="p14">
       <p:transition spd="slow" p14:dur="2000"/>
     </mc:Choice>
     <mc:Fallback>
@@ -14098,7 +14101,7 @@
     <a:masterClrMapping/>
   </p:clrMapOvr>
   <mc:AlternateContent xmlns:mc="http://schemas.openxmlformats.org/markup-compatibility/2006">
-    <mc:Choice xmlns="" xmlns:p14="http://schemas.microsoft.com/office/powerpoint/2010/main" xmlns:p15="http://schemas.microsoft.com/office/powerpoint/2012/main" Requires="p14">
+    <mc:Choice xmlns:p15="http://schemas.microsoft.com/office/powerpoint/2012/main" xmlns:p14="http://schemas.microsoft.com/office/powerpoint/2010/main" xmlns="" Requires="p14">
       <p:transition spd="slow" p14:dur="2000"/>
     </mc:Choice>
     <mc:Fallback>
@@ -14292,7 +14295,7 @@
     <a:masterClrMapping/>
   </p:clrMapOvr>
   <mc:AlternateContent xmlns:mc="http://schemas.openxmlformats.org/markup-compatibility/2006">
-    <mc:Choice xmlns="" xmlns:p14="http://schemas.microsoft.com/office/powerpoint/2010/main" xmlns:p15="http://schemas.microsoft.com/office/powerpoint/2012/main" Requires="p14">
+    <mc:Choice xmlns:p15="http://schemas.microsoft.com/office/powerpoint/2012/main" xmlns:p14="http://schemas.microsoft.com/office/powerpoint/2010/main" xmlns="" Requires="p14">
       <p:transition spd="slow" p14:dur="2000"/>
     </mc:Choice>
     <mc:Fallback>
@@ -14885,7 +14888,7 @@
     <a:masterClrMapping/>
   </p:clrMapOvr>
   <mc:AlternateContent xmlns:mc="http://schemas.openxmlformats.org/markup-compatibility/2006">
-    <mc:Choice xmlns="" xmlns:p14="http://schemas.microsoft.com/office/powerpoint/2010/main" xmlns:p15="http://schemas.microsoft.com/office/powerpoint/2012/main" Requires="p14">
+    <mc:Choice xmlns:p15="http://schemas.microsoft.com/office/powerpoint/2012/main" xmlns:p14="http://schemas.microsoft.com/office/powerpoint/2010/main" xmlns="" Requires="p14">
       <p:transition spd="slow" p14:dur="2000"/>
     </mc:Choice>
     <mc:Fallback>
@@ -15076,7 +15079,7 @@
     <a:masterClrMapping/>
   </p:clrMapOvr>
   <mc:AlternateContent xmlns:mc="http://schemas.openxmlformats.org/markup-compatibility/2006">
-    <mc:Choice xmlns="" xmlns:p14="http://schemas.microsoft.com/office/powerpoint/2010/main" xmlns:p15="http://schemas.microsoft.com/office/powerpoint/2012/main" Requires="p14">
+    <mc:Choice xmlns:p15="http://schemas.microsoft.com/office/powerpoint/2012/main" xmlns:p14="http://schemas.microsoft.com/office/powerpoint/2010/main" xmlns="" Requires="p14">
       <p:transition spd="slow" p14:dur="2000"/>
     </mc:Choice>
     <mc:Fallback>
@@ -15349,7 +15352,7 @@
     <a:masterClrMapping/>
   </p:clrMapOvr>
   <mc:AlternateContent xmlns:mc="http://schemas.openxmlformats.org/markup-compatibility/2006">
-    <mc:Choice xmlns="" xmlns:p14="http://schemas.microsoft.com/office/powerpoint/2010/main" xmlns:p15="http://schemas.microsoft.com/office/powerpoint/2012/main" Requires="p14">
+    <mc:Choice xmlns:p15="http://schemas.microsoft.com/office/powerpoint/2012/main" xmlns:p14="http://schemas.microsoft.com/office/powerpoint/2010/main" xmlns="" Requires="p14">
       <p:transition spd="slow" p14:dur="2000"/>
     </mc:Choice>
     <mc:Fallback>
@@ -15661,7 +15664,7 @@
     <a:masterClrMapping/>
   </p:clrMapOvr>
   <mc:AlternateContent xmlns:mc="http://schemas.openxmlformats.org/markup-compatibility/2006">
-    <mc:Choice xmlns="" xmlns:p14="http://schemas.microsoft.com/office/powerpoint/2010/main" xmlns:p15="http://schemas.microsoft.com/office/powerpoint/2012/main" Requires="p14">
+    <mc:Choice xmlns:p15="http://schemas.microsoft.com/office/powerpoint/2012/main" xmlns:p14="http://schemas.microsoft.com/office/powerpoint/2010/main" xmlns="" Requires="p14">
       <p:transition spd="slow" p14:dur="2000"/>
     </mc:Choice>
     <mc:Fallback>
@@ -15973,7 +15976,7 @@
     <a:masterClrMapping/>
   </p:clrMapOvr>
   <mc:AlternateContent xmlns:mc="http://schemas.openxmlformats.org/markup-compatibility/2006">
-    <mc:Choice xmlns="" xmlns:p14="http://schemas.microsoft.com/office/powerpoint/2010/main" xmlns:p15="http://schemas.microsoft.com/office/powerpoint/2012/main" Requires="p14">
+    <mc:Choice xmlns:p15="http://schemas.microsoft.com/office/powerpoint/2012/main" xmlns:p14="http://schemas.microsoft.com/office/powerpoint/2010/main" xmlns="" Requires="p14">
       <p:transition spd="slow" p14:dur="2000"/>
     </mc:Choice>
     <mc:Fallback>
@@ -16167,7 +16170,7 @@
     <a:masterClrMapping/>
   </p:clrMapOvr>
   <mc:AlternateContent xmlns:mc="http://schemas.openxmlformats.org/markup-compatibility/2006">
-    <mc:Choice xmlns="" xmlns:p14="http://schemas.microsoft.com/office/powerpoint/2010/main" xmlns:p15="http://schemas.microsoft.com/office/powerpoint/2012/main" Requires="p14">
+    <mc:Choice xmlns:p15="http://schemas.microsoft.com/office/powerpoint/2012/main" xmlns:p14="http://schemas.microsoft.com/office/powerpoint/2010/main" xmlns="" Requires="p14">
       <p:transition spd="slow" p14:dur="2000"/>
     </mc:Choice>
     <mc:Fallback>
@@ -16749,7 +16752,7 @@
     <a:masterClrMapping/>
   </p:clrMapOvr>
   <mc:AlternateContent xmlns:mc="http://schemas.openxmlformats.org/markup-compatibility/2006">
-    <mc:Choice xmlns="" xmlns:p14="http://schemas.microsoft.com/office/powerpoint/2010/main" xmlns:p15="http://schemas.microsoft.com/office/powerpoint/2012/main" Requires="p14">
+    <mc:Choice xmlns:p15="http://schemas.microsoft.com/office/powerpoint/2012/main" xmlns:p14="http://schemas.microsoft.com/office/powerpoint/2010/main" xmlns="" Requires="p14">
       <p:transition spd="slow" p14:dur="2000"/>
     </mc:Choice>
     <mc:Fallback>
@@ -16943,7 +16946,7 @@
     <a:masterClrMapping/>
   </p:clrMapOvr>
   <mc:AlternateContent xmlns:mc="http://schemas.openxmlformats.org/markup-compatibility/2006">
-    <mc:Choice xmlns="" xmlns:p14="http://schemas.microsoft.com/office/powerpoint/2010/main" xmlns:p15="http://schemas.microsoft.com/office/powerpoint/2012/main" Requires="p14">
+    <mc:Choice xmlns:p15="http://schemas.microsoft.com/office/powerpoint/2012/main" xmlns:p14="http://schemas.microsoft.com/office/powerpoint/2010/main" xmlns="" Requires="p14">
       <p:transition spd="slow" p14:dur="2000"/>
     </mc:Choice>
     <mc:Fallback>
@@ -17520,7 +17523,7 @@
     <a:masterClrMapping/>
   </p:clrMapOvr>
   <mc:AlternateContent xmlns:mc="http://schemas.openxmlformats.org/markup-compatibility/2006">
-    <mc:Choice xmlns="" xmlns:p14="http://schemas.microsoft.com/office/powerpoint/2010/main" xmlns:p15="http://schemas.microsoft.com/office/powerpoint/2012/main" Requires="p14">
+    <mc:Choice xmlns:p15="http://schemas.microsoft.com/office/powerpoint/2012/main" xmlns:p14="http://schemas.microsoft.com/office/powerpoint/2010/main" xmlns="" Requires="p14">
       <p:transition spd="slow" p14:dur="2000"/>
     </mc:Choice>
     <mc:Fallback>
@@ -17714,7 +17717,7 @@
     <a:masterClrMapping/>
   </p:clrMapOvr>
   <mc:AlternateContent xmlns:mc="http://schemas.openxmlformats.org/markup-compatibility/2006">
-    <mc:Choice xmlns="" xmlns:p14="http://schemas.microsoft.com/office/powerpoint/2010/main" xmlns:p15="http://schemas.microsoft.com/office/powerpoint/2012/main" Requires="p14">
+    <mc:Choice xmlns:p15="http://schemas.microsoft.com/office/powerpoint/2012/main" xmlns:p14="http://schemas.microsoft.com/office/powerpoint/2010/main" xmlns="" Requires="p14">
       <p:transition spd="slow" p14:dur="2000"/>
     </mc:Choice>
     <mc:Fallback>
@@ -18241,7 +18244,7 @@
     <a:masterClrMapping/>
   </p:clrMapOvr>
   <mc:AlternateContent xmlns:mc="http://schemas.openxmlformats.org/markup-compatibility/2006">
-    <mc:Choice xmlns="" xmlns:p14="http://schemas.microsoft.com/office/powerpoint/2010/main" xmlns:p15="http://schemas.microsoft.com/office/powerpoint/2012/main" Requires="p14">
+    <mc:Choice xmlns:p15="http://schemas.microsoft.com/office/powerpoint/2012/main" xmlns:p14="http://schemas.microsoft.com/office/powerpoint/2010/main" xmlns="" Requires="p14">
       <p:transition spd="slow" p14:dur="2000"/>
     </mc:Choice>
     <mc:Fallback>
@@ -18693,7 +18696,7 @@
     <a:masterClrMapping/>
   </p:clrMapOvr>
   <mc:AlternateContent xmlns:mc="http://schemas.openxmlformats.org/markup-compatibility/2006">
-    <mc:Choice xmlns="" xmlns:p14="http://schemas.microsoft.com/office/powerpoint/2010/main" xmlns:p15="http://schemas.microsoft.com/office/powerpoint/2012/main" Requires="p14">
+    <mc:Choice xmlns:p15="http://schemas.microsoft.com/office/powerpoint/2012/main" xmlns:p14="http://schemas.microsoft.com/office/powerpoint/2010/main" xmlns="" Requires="p14">
       <p:transition spd="slow" p14:dur="2000"/>
     </mc:Choice>
     <mc:Fallback>

</xml_diff>

<commit_message>
v1: private messages attribute of each inherited runtime exception class in backend_store
</commit_message>
<xml_diff>
--- a/docs/PPT/PPT.pptx
+++ b/docs/PPT/PPT.pptx
@@ -8597,7 +8597,7 @@
     <a:masterClrMapping/>
   </p:clrMapOvr>
   <mc:AlternateContent xmlns:mc="http://schemas.openxmlformats.org/markup-compatibility/2006">
-    <mc:Choice xmlns:p15="http://schemas.microsoft.com/office/powerpoint/2012/main" xmlns:p14="http://schemas.microsoft.com/office/powerpoint/2010/main" xmlns="" Requires="p14">
+    <mc:Choice xmlns="" xmlns:p14="http://schemas.microsoft.com/office/powerpoint/2010/main" xmlns:p15="http://schemas.microsoft.com/office/powerpoint/2012/main" Requires="p14">
       <p:transition spd="slow" p14:dur="2000"/>
     </mc:Choice>
     <mc:Fallback>
@@ -8899,7 +8899,7 @@
     <a:masterClrMapping/>
   </p:clrMapOvr>
   <mc:AlternateContent xmlns:mc="http://schemas.openxmlformats.org/markup-compatibility/2006">
-    <mc:Choice xmlns:p15="http://schemas.microsoft.com/office/powerpoint/2012/main" xmlns:p14="http://schemas.microsoft.com/office/powerpoint/2010/main" xmlns="" Requires="p14">
+    <mc:Choice xmlns="" xmlns:p14="http://schemas.microsoft.com/office/powerpoint/2010/main" xmlns:p15="http://schemas.microsoft.com/office/powerpoint/2012/main" Requires="p14">
       <p:transition spd="slow" p14:dur="2000"/>
     </mc:Choice>
     <mc:Fallback>
@@ -9201,7 +9201,7 @@
     <a:masterClrMapping/>
   </p:clrMapOvr>
   <mc:AlternateContent xmlns:mc="http://schemas.openxmlformats.org/markup-compatibility/2006">
-    <mc:Choice xmlns:p15="http://schemas.microsoft.com/office/powerpoint/2012/main" xmlns:p14="http://schemas.microsoft.com/office/powerpoint/2010/main" xmlns="" Requires="p14">
+    <mc:Choice xmlns="" xmlns:p14="http://schemas.microsoft.com/office/powerpoint/2010/main" xmlns:p15="http://schemas.microsoft.com/office/powerpoint/2012/main" Requires="p14">
       <p:transition spd="slow" p14:dur="2000"/>
     </mc:Choice>
     <mc:Fallback>
@@ -9678,7 +9678,7 @@
     <a:masterClrMapping/>
   </p:clrMapOvr>
   <mc:AlternateContent xmlns:mc="http://schemas.openxmlformats.org/markup-compatibility/2006">
-    <mc:Choice xmlns:p15="http://schemas.microsoft.com/office/powerpoint/2012/main" xmlns:p14="http://schemas.microsoft.com/office/powerpoint/2010/main" xmlns="" Requires="p14">
+    <mc:Choice xmlns="" xmlns:p14="http://schemas.microsoft.com/office/powerpoint/2010/main" xmlns:p15="http://schemas.microsoft.com/office/powerpoint/2012/main" Requires="p14">
       <p:transition spd="slow" p14:dur="2000"/>
     </mc:Choice>
     <mc:Fallback>
@@ -10205,7 +10205,7 @@
     <a:masterClrMapping/>
   </p:clrMapOvr>
   <mc:AlternateContent xmlns:mc="http://schemas.openxmlformats.org/markup-compatibility/2006">
-    <mc:Choice xmlns:p15="http://schemas.microsoft.com/office/powerpoint/2012/main" xmlns:p14="http://schemas.microsoft.com/office/powerpoint/2010/main" xmlns="" Requires="p14">
+    <mc:Choice xmlns="" xmlns:p14="http://schemas.microsoft.com/office/powerpoint/2010/main" xmlns:p15="http://schemas.microsoft.com/office/powerpoint/2012/main" Requires="p14">
       <p:transition spd="slow" p14:dur="2000"/>
     </mc:Choice>
     <mc:Fallback>
@@ -10399,7 +10399,7 @@
     <a:masterClrMapping/>
   </p:clrMapOvr>
   <mc:AlternateContent xmlns:mc="http://schemas.openxmlformats.org/markup-compatibility/2006">
-    <mc:Choice xmlns:p15="http://schemas.microsoft.com/office/powerpoint/2012/main" xmlns:p14="http://schemas.microsoft.com/office/powerpoint/2010/main" xmlns="" Requires="p14">
+    <mc:Choice xmlns="" xmlns:p14="http://schemas.microsoft.com/office/powerpoint/2010/main" xmlns:p15="http://schemas.microsoft.com/office/powerpoint/2012/main" Requires="p14">
       <p:transition spd="slow" p14:dur="2000"/>
     </mc:Choice>
     <mc:Fallback>
@@ -11675,7 +11675,7 @@
     <a:masterClrMapping/>
   </p:clrMapOvr>
   <mc:AlternateContent xmlns:mc="http://schemas.openxmlformats.org/markup-compatibility/2006">
-    <mc:Choice xmlns:p15="http://schemas.microsoft.com/office/powerpoint/2012/main" xmlns:p14="http://schemas.microsoft.com/office/powerpoint/2010/main" xmlns="" Requires="p14">
+    <mc:Choice xmlns="" xmlns:p14="http://schemas.microsoft.com/office/powerpoint/2010/main" xmlns:p15="http://schemas.microsoft.com/office/powerpoint/2012/main" Requires="p14">
       <p:transition spd="slow" p14:dur="2000"/>
     </mc:Choice>
     <mc:Fallback>
@@ -11869,7 +11869,7 @@
     <a:masterClrMapping/>
   </p:clrMapOvr>
   <mc:AlternateContent xmlns:mc="http://schemas.openxmlformats.org/markup-compatibility/2006">
-    <mc:Choice xmlns:p15="http://schemas.microsoft.com/office/powerpoint/2012/main" xmlns:p14="http://schemas.microsoft.com/office/powerpoint/2010/main" xmlns="" Requires="p14">
+    <mc:Choice xmlns="" xmlns:p14="http://schemas.microsoft.com/office/powerpoint/2010/main" xmlns:p15="http://schemas.microsoft.com/office/powerpoint/2012/main" Requires="p14">
       <p:transition spd="slow" p14:dur="2000"/>
     </mc:Choice>
     <mc:Fallback>
@@ -12103,7 +12103,7 @@
     <a:masterClrMapping/>
   </p:clrMapOvr>
   <mc:AlternateContent xmlns:mc="http://schemas.openxmlformats.org/markup-compatibility/2006">
-    <mc:Choice xmlns:p15="http://schemas.microsoft.com/office/powerpoint/2012/main" xmlns:p14="http://schemas.microsoft.com/office/powerpoint/2010/main" xmlns="" Requires="p14">
+    <mc:Choice xmlns="" xmlns:p14="http://schemas.microsoft.com/office/powerpoint/2010/main" xmlns:p15="http://schemas.microsoft.com/office/powerpoint/2012/main" Requires="p14">
       <p:transition spd="slow" p14:dur="2000"/>
     </mc:Choice>
     <mc:Fallback>
@@ -12297,7 +12297,7 @@
     <a:masterClrMapping/>
   </p:clrMapOvr>
   <mc:AlternateContent xmlns:mc="http://schemas.openxmlformats.org/markup-compatibility/2006">
-    <mc:Choice xmlns:p15="http://schemas.microsoft.com/office/powerpoint/2012/main" xmlns:p14="http://schemas.microsoft.com/office/powerpoint/2010/main" xmlns="" Requires="p14">
+    <mc:Choice xmlns="" xmlns:p14="http://schemas.microsoft.com/office/powerpoint/2010/main" xmlns:p15="http://schemas.microsoft.com/office/powerpoint/2012/main" Requires="p14">
       <p:transition spd="slow" p14:dur="2000"/>
     </mc:Choice>
     <mc:Fallback>
@@ -12528,7 +12528,7 @@
     <a:masterClrMapping/>
   </p:clrMapOvr>
   <mc:AlternateContent xmlns:mc="http://schemas.openxmlformats.org/markup-compatibility/2006">
-    <mc:Choice xmlns:p15="http://schemas.microsoft.com/office/powerpoint/2012/main" xmlns:p14="http://schemas.microsoft.com/office/powerpoint/2010/main" xmlns="" Requires="p14">
+    <mc:Choice xmlns="" xmlns:p14="http://schemas.microsoft.com/office/powerpoint/2010/main" xmlns:p15="http://schemas.microsoft.com/office/powerpoint/2012/main" Requires="p14">
       <p:transition spd="slow" p14:dur="2000"/>
     </mc:Choice>
     <mc:Fallback>
@@ -13676,7 +13676,7 @@
     <a:masterClrMapping/>
   </p:clrMapOvr>
   <mc:AlternateContent xmlns:mc="http://schemas.openxmlformats.org/markup-compatibility/2006">
-    <mc:Choice xmlns:p15="http://schemas.microsoft.com/office/powerpoint/2012/main" xmlns:p14="http://schemas.microsoft.com/office/powerpoint/2010/main" xmlns="" Requires="p14">
+    <mc:Choice xmlns="" xmlns:p14="http://schemas.microsoft.com/office/powerpoint/2010/main" xmlns:p15="http://schemas.microsoft.com/office/powerpoint/2012/main" Requires="p14">
       <p:transition spd="slow" p14:dur="2000"/>
     </mc:Choice>
     <mc:Fallback>
@@ -13870,7 +13870,7 @@
     <a:masterClrMapping/>
   </p:clrMapOvr>
   <mc:AlternateContent xmlns:mc="http://schemas.openxmlformats.org/markup-compatibility/2006">
-    <mc:Choice xmlns:p15="http://schemas.microsoft.com/office/powerpoint/2012/main" xmlns:p14="http://schemas.microsoft.com/office/powerpoint/2010/main" xmlns="" Requires="p14">
+    <mc:Choice xmlns="" xmlns:p14="http://schemas.microsoft.com/office/powerpoint/2010/main" xmlns:p15="http://schemas.microsoft.com/office/powerpoint/2012/main" Requires="p14">
       <p:transition spd="slow" p14:dur="2000"/>
     </mc:Choice>
     <mc:Fallback>
@@ -14101,7 +14101,7 @@
     <a:masterClrMapping/>
   </p:clrMapOvr>
   <mc:AlternateContent xmlns:mc="http://schemas.openxmlformats.org/markup-compatibility/2006">
-    <mc:Choice xmlns:p15="http://schemas.microsoft.com/office/powerpoint/2012/main" xmlns:p14="http://schemas.microsoft.com/office/powerpoint/2010/main" xmlns="" Requires="p14">
+    <mc:Choice xmlns="" xmlns:p14="http://schemas.microsoft.com/office/powerpoint/2010/main" xmlns:p15="http://schemas.microsoft.com/office/powerpoint/2012/main" Requires="p14">
       <p:transition spd="slow" p14:dur="2000"/>
     </mc:Choice>
     <mc:Fallback>
@@ -14295,7 +14295,7 @@
     <a:masterClrMapping/>
   </p:clrMapOvr>
   <mc:AlternateContent xmlns:mc="http://schemas.openxmlformats.org/markup-compatibility/2006">
-    <mc:Choice xmlns:p15="http://schemas.microsoft.com/office/powerpoint/2012/main" xmlns:p14="http://schemas.microsoft.com/office/powerpoint/2010/main" xmlns="" Requires="p14">
+    <mc:Choice xmlns="" xmlns:p14="http://schemas.microsoft.com/office/powerpoint/2010/main" xmlns:p15="http://schemas.microsoft.com/office/powerpoint/2012/main" Requires="p14">
       <p:transition spd="slow" p14:dur="2000"/>
     </mc:Choice>
     <mc:Fallback>
@@ -14888,7 +14888,7 @@
     <a:masterClrMapping/>
   </p:clrMapOvr>
   <mc:AlternateContent xmlns:mc="http://schemas.openxmlformats.org/markup-compatibility/2006">
-    <mc:Choice xmlns:p15="http://schemas.microsoft.com/office/powerpoint/2012/main" xmlns:p14="http://schemas.microsoft.com/office/powerpoint/2010/main" xmlns="" Requires="p14">
+    <mc:Choice xmlns="" xmlns:p14="http://schemas.microsoft.com/office/powerpoint/2010/main" xmlns:p15="http://schemas.microsoft.com/office/powerpoint/2012/main" Requires="p14">
       <p:transition spd="slow" p14:dur="2000"/>
     </mc:Choice>
     <mc:Fallback>
@@ -15079,7 +15079,7 @@
     <a:masterClrMapping/>
   </p:clrMapOvr>
   <mc:AlternateContent xmlns:mc="http://schemas.openxmlformats.org/markup-compatibility/2006">
-    <mc:Choice xmlns:p15="http://schemas.microsoft.com/office/powerpoint/2012/main" xmlns:p14="http://schemas.microsoft.com/office/powerpoint/2010/main" xmlns="" Requires="p14">
+    <mc:Choice xmlns="" xmlns:p14="http://schemas.microsoft.com/office/powerpoint/2010/main" xmlns:p15="http://schemas.microsoft.com/office/powerpoint/2012/main" Requires="p14">
       <p:transition spd="slow" p14:dur="2000"/>
     </mc:Choice>
     <mc:Fallback>
@@ -15352,7 +15352,7 @@
     <a:masterClrMapping/>
   </p:clrMapOvr>
   <mc:AlternateContent xmlns:mc="http://schemas.openxmlformats.org/markup-compatibility/2006">
-    <mc:Choice xmlns:p15="http://schemas.microsoft.com/office/powerpoint/2012/main" xmlns:p14="http://schemas.microsoft.com/office/powerpoint/2010/main" xmlns="" Requires="p14">
+    <mc:Choice xmlns="" xmlns:p14="http://schemas.microsoft.com/office/powerpoint/2010/main" xmlns:p15="http://schemas.microsoft.com/office/powerpoint/2012/main" Requires="p14">
       <p:transition spd="slow" p14:dur="2000"/>
     </mc:Choice>
     <mc:Fallback>
@@ -15664,7 +15664,7 @@
     <a:masterClrMapping/>
   </p:clrMapOvr>
   <mc:AlternateContent xmlns:mc="http://schemas.openxmlformats.org/markup-compatibility/2006">
-    <mc:Choice xmlns:p15="http://schemas.microsoft.com/office/powerpoint/2012/main" xmlns:p14="http://schemas.microsoft.com/office/powerpoint/2010/main" xmlns="" Requires="p14">
+    <mc:Choice xmlns="" xmlns:p14="http://schemas.microsoft.com/office/powerpoint/2010/main" xmlns:p15="http://schemas.microsoft.com/office/powerpoint/2012/main" Requires="p14">
       <p:transition spd="slow" p14:dur="2000"/>
     </mc:Choice>
     <mc:Fallback>
@@ -15976,7 +15976,7 @@
     <a:masterClrMapping/>
   </p:clrMapOvr>
   <mc:AlternateContent xmlns:mc="http://schemas.openxmlformats.org/markup-compatibility/2006">
-    <mc:Choice xmlns:p15="http://schemas.microsoft.com/office/powerpoint/2012/main" xmlns:p14="http://schemas.microsoft.com/office/powerpoint/2010/main" xmlns="" Requires="p14">
+    <mc:Choice xmlns="" xmlns:p14="http://schemas.microsoft.com/office/powerpoint/2010/main" xmlns:p15="http://schemas.microsoft.com/office/powerpoint/2012/main" Requires="p14">
       <p:transition spd="slow" p14:dur="2000"/>
     </mc:Choice>
     <mc:Fallback>
@@ -16170,7 +16170,7 @@
     <a:masterClrMapping/>
   </p:clrMapOvr>
   <mc:AlternateContent xmlns:mc="http://schemas.openxmlformats.org/markup-compatibility/2006">
-    <mc:Choice xmlns:p15="http://schemas.microsoft.com/office/powerpoint/2012/main" xmlns:p14="http://schemas.microsoft.com/office/powerpoint/2010/main" xmlns="" Requires="p14">
+    <mc:Choice xmlns="" xmlns:p14="http://schemas.microsoft.com/office/powerpoint/2010/main" xmlns:p15="http://schemas.microsoft.com/office/powerpoint/2012/main" Requires="p14">
       <p:transition spd="slow" p14:dur="2000"/>
     </mc:Choice>
     <mc:Fallback>
@@ -16752,7 +16752,7 @@
     <a:masterClrMapping/>
   </p:clrMapOvr>
   <mc:AlternateContent xmlns:mc="http://schemas.openxmlformats.org/markup-compatibility/2006">
-    <mc:Choice xmlns:p15="http://schemas.microsoft.com/office/powerpoint/2012/main" xmlns:p14="http://schemas.microsoft.com/office/powerpoint/2010/main" xmlns="" Requires="p14">
+    <mc:Choice xmlns="" xmlns:p14="http://schemas.microsoft.com/office/powerpoint/2010/main" xmlns:p15="http://schemas.microsoft.com/office/powerpoint/2012/main" Requires="p14">
       <p:transition spd="slow" p14:dur="2000"/>
     </mc:Choice>
     <mc:Fallback>
@@ -16946,7 +16946,7 @@
     <a:masterClrMapping/>
   </p:clrMapOvr>
   <mc:AlternateContent xmlns:mc="http://schemas.openxmlformats.org/markup-compatibility/2006">
-    <mc:Choice xmlns:p15="http://schemas.microsoft.com/office/powerpoint/2012/main" xmlns:p14="http://schemas.microsoft.com/office/powerpoint/2010/main" xmlns="" Requires="p14">
+    <mc:Choice xmlns="" xmlns:p14="http://schemas.microsoft.com/office/powerpoint/2010/main" xmlns:p15="http://schemas.microsoft.com/office/powerpoint/2012/main" Requires="p14">
       <p:transition spd="slow" p14:dur="2000"/>
     </mc:Choice>
     <mc:Fallback>
@@ -17157,7 +17157,7 @@
         <p:spPr>
           <a:xfrm>
             <a:off x="531000" y="965880"/>
-            <a:ext cx="8321040" cy="3056760"/>
+            <a:ext cx="8321040" cy="3091700"/>
           </a:xfrm>
           <a:prstGeom prst="rect">
             <a:avLst/>
@@ -17202,7 +17202,7 @@
               <a:buChar char="•"/>
             </a:pPr>
             <a:r>
-              <a:rPr lang="en-ID" sz="1000" b="0" strike="noStrike" spc="-1">
+              <a:rPr lang="en-ID" sz="1000" b="0" strike="noStrike" spc="-1" dirty="0">
                 <a:solidFill>
                   <a:srgbClr val="000000"/>
                 </a:solidFill>
@@ -17211,7 +17211,7 @@
               </a:rPr>
               <a:t>REST API</a:t>
             </a:r>
-            <a:endParaRPr lang="en-US" sz="1000" b="0" strike="noStrike" spc="-1">
+            <a:endParaRPr lang="en-US" sz="1000" b="0" strike="noStrike" spc="-1" dirty="0">
               <a:latin typeface="Arial"/>
             </a:endParaRPr>
           </a:p>
@@ -17227,7 +17227,7 @@
               <a:buChar char="•"/>
             </a:pPr>
             <a:r>
-              <a:rPr lang="en-ID" sz="1000" b="0" strike="noStrike" spc="-1">
+              <a:rPr lang="en-ID" sz="1000" b="0" strike="noStrike" spc="-1" dirty="0">
                 <a:solidFill>
                   <a:srgbClr val="000000"/>
                 </a:solidFill>
@@ -17236,7 +17236,7 @@
               </a:rPr>
               <a:t>CI/CD</a:t>
             </a:r>
-            <a:endParaRPr lang="en-US" sz="1000" b="0" strike="noStrike" spc="-1">
+            <a:endParaRPr lang="en-US" sz="1000" b="0" strike="noStrike" spc="-1" dirty="0">
               <a:latin typeface="Arial"/>
             </a:endParaRPr>
           </a:p>
@@ -17252,7 +17252,7 @@
               <a:buChar char="•"/>
             </a:pPr>
             <a:r>
-              <a:rPr lang="en-ID" sz="1000" b="0" strike="noStrike" spc="-1">
+              <a:rPr lang="en-ID" sz="1000" b="0" strike="noStrike" spc="-1" dirty="0">
                 <a:solidFill>
                   <a:srgbClr val="000000"/>
                 </a:solidFill>
@@ -17261,7 +17261,7 @@
               </a:rPr>
               <a:t>JWT authentication</a:t>
             </a:r>
-            <a:endParaRPr lang="en-US" sz="1000" b="0" strike="noStrike" spc="-1">
+            <a:endParaRPr lang="en-US" sz="1000" b="0" strike="noStrike" spc="-1" dirty="0">
               <a:latin typeface="Arial"/>
             </a:endParaRPr>
           </a:p>
@@ -17277,7 +17277,7 @@
               <a:buChar char="•"/>
             </a:pPr>
             <a:r>
-              <a:rPr lang="en-ID" sz="1000" b="0" strike="noStrike" spc="-1">
+              <a:rPr lang="en-ID" sz="1000" b="0" strike="noStrike" spc="-1" dirty="0">
                 <a:solidFill>
                   <a:srgbClr val="000000"/>
                 </a:solidFill>
@@ -17286,7 +17286,7 @@
               </a:rPr>
               <a:t>Password recovery</a:t>
             </a:r>
-            <a:endParaRPr lang="en-US" sz="1000" b="0" strike="noStrike" spc="-1">
+            <a:endParaRPr lang="en-US" sz="1000" b="0" strike="noStrike" spc="-1" dirty="0">
               <a:latin typeface="Arial"/>
             </a:endParaRPr>
           </a:p>
@@ -17302,7 +17302,7 @@
               <a:buChar char="•"/>
             </a:pPr>
             <a:r>
-              <a:rPr lang="en-ID" sz="1000" b="0" strike="noStrike" spc="-1">
+              <a:rPr lang="en-ID" sz="1000" b="0" strike="noStrike" spc="-1" dirty="0">
                 <a:solidFill>
                   <a:srgbClr val="000000"/>
                 </a:solidFill>
@@ -17311,7 +17311,7 @@
               </a:rPr>
               <a:t>Error handling</a:t>
             </a:r>
-            <a:endParaRPr lang="en-US" sz="1000" b="0" strike="noStrike" spc="-1">
+            <a:endParaRPr lang="en-US" sz="1000" b="0" strike="noStrike" spc="-1" dirty="0">
               <a:latin typeface="Arial"/>
             </a:endParaRPr>
           </a:p>
@@ -17327,16 +17327,26 @@
               <a:buChar char="•"/>
             </a:pPr>
             <a:r>
-              <a:rPr lang="en-ID" sz="1000" b="0" strike="noStrike" spc="-1">
+              <a:rPr lang="en-ID" sz="1000" b="0" strike="noStrike" spc="-1" dirty="0" smtClean="0">
                 <a:solidFill>
                   <a:srgbClr val="000000"/>
                 </a:solidFill>
                 <a:latin typeface="Arial"/>
                 <a:ea typeface="Arial"/>
               </a:rPr>
-              <a:t>Cookie based visitor's shopping cart</a:t>
+              <a:t>Local storage based </a:t>
             </a:r>
-            <a:endParaRPr lang="en-US" sz="1000" b="0" strike="noStrike" spc="-1">
+            <a:r>
+              <a:rPr lang="en-ID" sz="1000" b="0" strike="noStrike" spc="-1" dirty="0">
+                <a:solidFill>
+                  <a:srgbClr val="000000"/>
+                </a:solidFill>
+                <a:latin typeface="Arial"/>
+                <a:ea typeface="Arial"/>
+              </a:rPr>
+              <a:t>visitor's shopping cart</a:t>
+            </a:r>
+            <a:endParaRPr lang="en-US" sz="1000" b="0" strike="noStrike" spc="-1" dirty="0">
               <a:latin typeface="Arial"/>
             </a:endParaRPr>
           </a:p>
@@ -17352,7 +17362,7 @@
               <a:buChar char="•"/>
             </a:pPr>
             <a:r>
-              <a:rPr lang="en-ID" sz="1000" b="0" strike="noStrike" spc="-1">
+              <a:rPr lang="en-ID" sz="1000" b="0" strike="noStrike" spc="-1" dirty="0">
                 <a:solidFill>
                   <a:srgbClr val="000000"/>
                 </a:solidFill>
@@ -17361,7 +17371,7 @@
               </a:rPr>
               <a:t>Persistent customer's shopping cart</a:t>
             </a:r>
-            <a:endParaRPr lang="en-US" sz="1000" b="0" strike="noStrike" spc="-1">
+            <a:endParaRPr lang="en-US" sz="1000" b="0" strike="noStrike" spc="-1" dirty="0">
               <a:latin typeface="Arial"/>
             </a:endParaRPr>
           </a:p>
@@ -17377,16 +17387,16 @@
               <a:buChar char="•"/>
             </a:pPr>
             <a:r>
-              <a:rPr lang="en-ID" sz="1000" b="0" strike="noStrike" spc="-1">
+              <a:rPr lang="en-US" sz="1000" b="0" strike="noStrike" spc="-1" dirty="0" smtClean="0">
                 <a:solidFill>
                   <a:srgbClr val="000000"/>
                 </a:solidFill>
                 <a:latin typeface="Arial"/>
                 <a:ea typeface="Arial"/>
               </a:rPr>
-              <a:t>Cart and order management</a:t>
+              <a:t>Product management</a:t>
             </a:r>
-            <a:endParaRPr lang="en-US" sz="1000" b="0" strike="noStrike" spc="-1">
+            <a:endParaRPr lang="en-US" sz="1000" b="0" strike="noStrike" spc="-1" dirty="0">
               <a:latin typeface="Arial"/>
             </a:endParaRPr>
           </a:p>
@@ -17402,16 +17412,16 @@
               <a:buChar char="•"/>
             </a:pPr>
             <a:r>
-              <a:rPr lang="en-ID" sz="1000" b="0" strike="noStrike" spc="-1">
+              <a:rPr lang="en-ID" sz="1000" b="0" strike="noStrike" spc="-1" dirty="0" smtClean="0">
                 <a:solidFill>
                   <a:srgbClr val="000000"/>
                 </a:solidFill>
                 <a:latin typeface="Arial"/>
                 <a:ea typeface="Arial"/>
               </a:rPr>
-              <a:t>Checkout</a:t>
+              <a:t>Cart management</a:t>
             </a:r>
-            <a:endParaRPr lang="en-US" sz="1000" b="0" strike="noStrike" spc="-1">
+            <a:endParaRPr lang="en-US" sz="1000" b="0" strike="noStrike" spc="-1" dirty="0">
               <a:latin typeface="Arial"/>
             </a:endParaRPr>
           </a:p>
@@ -17427,16 +17437,16 @@
               <a:buChar char="•"/>
             </a:pPr>
             <a:r>
-              <a:rPr lang="en-ID" sz="1000" b="0" strike="noStrike" spc="-1">
+              <a:rPr lang="en-ID" sz="1000" b="0" strike="noStrike" spc="-1" dirty="0">
                 <a:solidFill>
                   <a:srgbClr val="000000"/>
                 </a:solidFill>
                 <a:latin typeface="Arial"/>
                 <a:ea typeface="Arial"/>
               </a:rPr>
-              <a:t>Catalogue</a:t>
+              <a:t>Order management</a:t>
             </a:r>
-            <a:endParaRPr lang="en-US" sz="1000" b="0" strike="noStrike" spc="-1">
+            <a:endParaRPr lang="en-US" sz="1000" b="0" strike="noStrike" spc="-1" dirty="0">
               <a:latin typeface="Arial"/>
             </a:endParaRPr>
           </a:p>
@@ -17452,18 +17462,25 @@
               <a:buChar char="•"/>
             </a:pPr>
             <a:r>
-              <a:rPr lang="en-ID" sz="1000" b="0" strike="noStrike" spc="-1">
+              <a:rPr lang="en-ID" sz="1000" b="0" strike="noStrike" spc="-1" dirty="0">
                 <a:solidFill>
                   <a:srgbClr val="000000"/>
                 </a:solidFill>
                 <a:latin typeface="Arial"/>
                 <a:ea typeface="Arial"/>
               </a:rPr>
-              <a:t>Order management</a:t>
+              <a:t>Subscription </a:t>
             </a:r>
-            <a:endParaRPr lang="en-US" sz="1000" b="0" strike="noStrike" spc="-1">
-              <a:latin typeface="Arial"/>
-            </a:endParaRPr>
+            <a:r>
+              <a:rPr lang="en-ID" sz="1000" b="0" strike="noStrike" spc="-1" dirty="0" smtClean="0">
+                <a:solidFill>
+                  <a:srgbClr val="000000"/>
+                </a:solidFill>
+                <a:latin typeface="Arial"/>
+                <a:ea typeface="Arial"/>
+              </a:rPr>
+              <a:t>management</a:t>
+            </a:r>
           </a:p>
           <a:p>
             <a:pPr marL="285840" indent="-285840" algn="just">
@@ -17477,16 +17494,15 @@
               <a:buChar char="•"/>
             </a:pPr>
             <a:r>
-              <a:rPr lang="en-ID" sz="1000" b="0" strike="noStrike" spc="-1">
+              <a:rPr lang="en-ID" sz="1000" spc="-1" smtClean="0">
                 <a:solidFill>
                   <a:srgbClr val="000000"/>
                 </a:solidFill>
                 <a:latin typeface="Arial"/>
-                <a:ea typeface="Arial"/>
               </a:rPr>
-              <a:t>Subscription management</a:t>
+              <a:t>Profile management</a:t>
             </a:r>
-            <a:endParaRPr lang="en-US" sz="1000" b="0" strike="noStrike" spc="-1">
+            <a:endParaRPr lang="en-US" sz="1000" b="0" strike="noStrike" spc="-1" dirty="0">
               <a:latin typeface="Arial"/>
             </a:endParaRPr>
           </a:p>
@@ -17502,7 +17518,7 @@
               <a:buChar char="•"/>
             </a:pPr>
             <a:r>
-              <a:rPr lang="en-ID" sz="1000" b="0" strike="noStrike" spc="-1">
+              <a:rPr lang="en-ID" sz="1000" b="0" strike="noStrike" spc="-1" dirty="0">
                 <a:solidFill>
                   <a:srgbClr val="000000"/>
                 </a:solidFill>
@@ -17511,7 +17527,7 @@
               </a:rPr>
               <a:t>Pagination</a:t>
             </a:r>
-            <a:endParaRPr lang="en-US" sz="1000" b="0" strike="noStrike" spc="-1">
+            <a:endParaRPr lang="en-US" sz="1000" b="0" strike="noStrike" spc="-1" dirty="0">
               <a:latin typeface="Arial"/>
             </a:endParaRPr>
           </a:p>
@@ -17523,7 +17539,7 @@
     <a:masterClrMapping/>
   </p:clrMapOvr>
   <mc:AlternateContent xmlns:mc="http://schemas.openxmlformats.org/markup-compatibility/2006">
-    <mc:Choice xmlns:p15="http://schemas.microsoft.com/office/powerpoint/2012/main" xmlns:p14="http://schemas.microsoft.com/office/powerpoint/2010/main" xmlns="" Requires="p14">
+    <mc:Choice xmlns="" xmlns:p14="http://schemas.microsoft.com/office/powerpoint/2010/main" xmlns:p15="http://schemas.microsoft.com/office/powerpoint/2012/main" Requires="p14">
       <p:transition spd="slow" p14:dur="2000"/>
     </mc:Choice>
     <mc:Fallback>
@@ -17717,7 +17733,7 @@
     <a:masterClrMapping/>
   </p:clrMapOvr>
   <mc:AlternateContent xmlns:mc="http://schemas.openxmlformats.org/markup-compatibility/2006">
-    <mc:Choice xmlns:p15="http://schemas.microsoft.com/office/powerpoint/2012/main" xmlns:p14="http://schemas.microsoft.com/office/powerpoint/2010/main" xmlns="" Requires="p14">
+    <mc:Choice xmlns="" xmlns:p14="http://schemas.microsoft.com/office/powerpoint/2010/main" xmlns:p15="http://schemas.microsoft.com/office/powerpoint/2012/main" Requires="p14">
       <p:transition spd="slow" p14:dur="2000"/>
     </mc:Choice>
     <mc:Fallback>
@@ -18244,7 +18260,7 @@
     <a:masterClrMapping/>
   </p:clrMapOvr>
   <mc:AlternateContent xmlns:mc="http://schemas.openxmlformats.org/markup-compatibility/2006">
-    <mc:Choice xmlns:p15="http://schemas.microsoft.com/office/powerpoint/2012/main" xmlns:p14="http://schemas.microsoft.com/office/powerpoint/2010/main" xmlns="" Requires="p14">
+    <mc:Choice xmlns="" xmlns:p14="http://schemas.microsoft.com/office/powerpoint/2010/main" xmlns:p15="http://schemas.microsoft.com/office/powerpoint/2012/main" Requires="p14">
       <p:transition spd="slow" p14:dur="2000"/>
     </mc:Choice>
     <mc:Fallback>
@@ -18696,7 +18712,7 @@
     <a:masterClrMapping/>
   </p:clrMapOvr>
   <mc:AlternateContent xmlns:mc="http://schemas.openxmlformats.org/markup-compatibility/2006">
-    <mc:Choice xmlns:p15="http://schemas.microsoft.com/office/powerpoint/2012/main" xmlns:p14="http://schemas.microsoft.com/office/powerpoint/2010/main" xmlns="" Requires="p14">
+    <mc:Choice xmlns="" xmlns:p14="http://schemas.microsoft.com/office/powerpoint/2010/main" xmlns:p15="http://schemas.microsoft.com/office/powerpoint/2012/main" Requires="p14">
       <p:transition spd="slow" p14:dur="2000"/>
     </mc:Choice>
     <mc:Fallback>

</xml_diff>